<commit_message>
Update WORKING WITH JSON FILES.pptx
</commit_message>
<xml_diff>
--- a/docpac_mar18/JasonLara/WORKING WITH JSON FILES.pptx
+++ b/docpac_mar18/JasonLara/WORKING WITH JSON FILES.pptx
@@ -7,12 +7,12 @@
   <p:sldIdLst>
     <p:sldId id="256" r:id="rId5"/>
     <p:sldId id="261" r:id="rId6"/>
-    <p:sldId id="260" r:id="rId7"/>
-    <p:sldId id="259" r:id="rId8"/>
-    <p:sldId id="257" r:id="rId9"/>
-    <p:sldId id="266" r:id="rId10"/>
-    <p:sldId id="267" r:id="rId11"/>
-    <p:sldId id="258" r:id="rId12"/>
+    <p:sldId id="259" r:id="rId7"/>
+    <p:sldId id="257" r:id="rId8"/>
+    <p:sldId id="266" r:id="rId9"/>
+    <p:sldId id="267" r:id="rId10"/>
+    <p:sldId id="258" r:id="rId11"/>
+    <p:sldId id="268" r:id="rId12"/>
   </p:sldIdLst>
   <p:sldSz cx="12192000" cy="6858000"/>
   <p:notesSz cx="6858000" cy="9144000"/>
@@ -473,7 +473,7 @@
           <a:noFill/>
           <a:extLst>
             <a:ext uri="{909E8E84-426E-40dd-AFC4-6F175D3DCCD1}">
-              <a14:hiddenFill xmlns:a14="http://schemas.microsoft.com/office/drawing/2010/main" xmlns="">
+              <a14:hiddenFill xmlns="" xmlns:a14="http://schemas.microsoft.com/office/drawing/2010/main">
                 <a:solidFill>
                   <a:srgbClr val="FFFFFF"/>
                 </a:solidFill>
@@ -533,7 +533,7 @@
             </a:ln>
             <a:extLst>
               <a:ext uri="{91240B29-F687-4f45-9708-019B960494DF}">
-                <a14:hiddenLine xmlns:a14="http://schemas.microsoft.com/office/drawing/2010/main" xmlns="" w="9525">
+                <a14:hiddenLine xmlns="" xmlns:a14="http://schemas.microsoft.com/office/drawing/2010/main" w="9525">
                   <a:solidFill>
                     <a:srgbClr val="000000"/>
                   </a:solidFill>
@@ -623,7 +623,7 @@
             </a:ln>
             <a:extLst>
               <a:ext uri="{91240B29-F687-4f45-9708-019B960494DF}">
-                <a14:hiddenLine xmlns:a14="http://schemas.microsoft.com/office/drawing/2010/main" xmlns="" w="9525">
+                <a14:hiddenLine xmlns="" xmlns:a14="http://schemas.microsoft.com/office/drawing/2010/main" w="9525">
                   <a:solidFill>
                     <a:srgbClr val="000000"/>
                   </a:solidFill>
@@ -713,7 +713,7 @@
             </a:ln>
             <a:extLst>
               <a:ext uri="{91240B29-F687-4f45-9708-019B960494DF}">
-                <a14:hiddenLine xmlns:a14="http://schemas.microsoft.com/office/drawing/2010/main" xmlns="" w="9525">
+                <a14:hiddenLine xmlns="" xmlns:a14="http://schemas.microsoft.com/office/drawing/2010/main" w="9525">
                   <a:solidFill>
                     <a:srgbClr val="000000"/>
                   </a:solidFill>
@@ -747,7 +747,7 @@
             </a:ln>
             <a:extLst>
               <a:ext uri="{91240B29-F687-4f45-9708-019B960494DF}">
-                <a14:hiddenLine xmlns:a14="http://schemas.microsoft.com/office/drawing/2010/main" xmlns="" w="9525">
+                <a14:hiddenLine xmlns="" xmlns:a14="http://schemas.microsoft.com/office/drawing/2010/main" w="9525">
                   <a:solidFill>
                     <a:srgbClr val="000000"/>
                   </a:solidFill>
@@ -837,7 +837,7 @@
             </a:ln>
             <a:extLst>
               <a:ext uri="{91240B29-F687-4f45-9708-019B960494DF}">
-                <a14:hiddenLine xmlns:a14="http://schemas.microsoft.com/office/drawing/2010/main" xmlns="" w="9525">
+                <a14:hiddenLine xmlns="" xmlns:a14="http://schemas.microsoft.com/office/drawing/2010/main" w="9525">
                   <a:solidFill>
                     <a:srgbClr val="000000"/>
                   </a:solidFill>
@@ -899,7 +899,7 @@
             </a:ln>
             <a:extLst>
               <a:ext uri="{91240B29-F687-4f45-9708-019B960494DF}">
-                <a14:hiddenLine xmlns:a14="http://schemas.microsoft.com/office/drawing/2010/main" xmlns="" w="9525">
+                <a14:hiddenLine xmlns="" xmlns:a14="http://schemas.microsoft.com/office/drawing/2010/main" w="9525">
                   <a:solidFill>
                     <a:srgbClr val="000000"/>
                   </a:solidFill>
@@ -961,7 +961,7 @@
             </a:ln>
             <a:extLst>
               <a:ext uri="{91240B29-F687-4f45-9708-019B960494DF}">
-                <a14:hiddenLine xmlns:a14="http://schemas.microsoft.com/office/drawing/2010/main" xmlns="" w="9525">
+                <a14:hiddenLine xmlns="" xmlns:a14="http://schemas.microsoft.com/office/drawing/2010/main" w="9525">
                   <a:solidFill>
                     <a:srgbClr val="000000"/>
                   </a:solidFill>
@@ -1051,7 +1051,7 @@
             </a:ln>
             <a:extLst>
               <a:ext uri="{91240B29-F687-4f45-9708-019B960494DF}">
-                <a14:hiddenLine xmlns:a14="http://schemas.microsoft.com/office/drawing/2010/main" xmlns="" w="9525">
+                <a14:hiddenLine xmlns="" xmlns:a14="http://schemas.microsoft.com/office/drawing/2010/main" w="9525">
                   <a:solidFill>
                     <a:srgbClr val="000000"/>
                   </a:solidFill>
@@ -1113,7 +1113,7 @@
             </a:ln>
             <a:extLst>
               <a:ext uri="{91240B29-F687-4f45-9708-019B960494DF}">
-                <a14:hiddenLine xmlns:a14="http://schemas.microsoft.com/office/drawing/2010/main" xmlns="" w="9525">
+                <a14:hiddenLine xmlns="" xmlns:a14="http://schemas.microsoft.com/office/drawing/2010/main" w="9525">
                   <a:solidFill>
                     <a:srgbClr val="000000"/>
                   </a:solidFill>
@@ -1175,7 +1175,7 @@
             </a:ln>
             <a:extLst>
               <a:ext uri="{91240B29-F687-4f45-9708-019B960494DF}">
-                <a14:hiddenLine xmlns:a14="http://schemas.microsoft.com/office/drawing/2010/main" xmlns="" w="9525">
+                <a14:hiddenLine xmlns="" xmlns:a14="http://schemas.microsoft.com/office/drawing/2010/main" w="9525">
                   <a:solidFill>
                     <a:srgbClr val="000000"/>
                   </a:solidFill>
@@ -1265,7 +1265,7 @@
             </a:ln>
             <a:extLst>
               <a:ext uri="{91240B29-F687-4f45-9708-019B960494DF}">
-                <a14:hiddenLine xmlns:a14="http://schemas.microsoft.com/office/drawing/2010/main" xmlns="" w="9525">
+                <a14:hiddenLine xmlns="" xmlns:a14="http://schemas.microsoft.com/office/drawing/2010/main" w="9525">
                   <a:solidFill>
                     <a:srgbClr val="000000"/>
                   </a:solidFill>
@@ -1355,7 +1355,7 @@
             </a:ln>
             <a:extLst>
               <a:ext uri="{91240B29-F687-4f45-9708-019B960494DF}">
-                <a14:hiddenLine xmlns:a14="http://schemas.microsoft.com/office/drawing/2010/main" xmlns="" w="9525">
+                <a14:hiddenLine xmlns="" xmlns:a14="http://schemas.microsoft.com/office/drawing/2010/main" w="9525">
                   <a:solidFill>
                     <a:srgbClr val="000000"/>
                   </a:solidFill>
@@ -1417,7 +1417,7 @@
             </a:ln>
             <a:extLst>
               <a:ext uri="{91240B29-F687-4f45-9708-019B960494DF}">
-                <a14:hiddenLine xmlns:a14="http://schemas.microsoft.com/office/drawing/2010/main" xmlns="" w="9525">
+                <a14:hiddenLine xmlns="" xmlns:a14="http://schemas.microsoft.com/office/drawing/2010/main" w="9525">
                   <a:solidFill>
                     <a:srgbClr val="000000"/>
                   </a:solidFill>
@@ -1527,7 +1527,7 @@
             </a:ln>
             <a:extLst>
               <a:ext uri="{91240B29-F687-4f45-9708-019B960494DF}">
-                <a14:hiddenLine xmlns:a14="http://schemas.microsoft.com/office/drawing/2010/main" xmlns="" w="9525">
+                <a14:hiddenLine xmlns="" xmlns:a14="http://schemas.microsoft.com/office/drawing/2010/main" w="9525">
                   <a:solidFill>
                     <a:srgbClr val="000000"/>
                   </a:solidFill>
@@ -1589,7 +1589,7 @@
             </a:ln>
             <a:extLst>
               <a:ext uri="{91240B29-F687-4f45-9708-019B960494DF}">
-                <a14:hiddenLine xmlns:a14="http://schemas.microsoft.com/office/drawing/2010/main" xmlns="" w="9525">
+                <a14:hiddenLine xmlns="" xmlns:a14="http://schemas.microsoft.com/office/drawing/2010/main" w="9525">
                   <a:solidFill>
                     <a:srgbClr val="000000"/>
                   </a:solidFill>
@@ -1679,7 +1679,7 @@
             </a:ln>
             <a:extLst>
               <a:ext uri="{91240B29-F687-4f45-9708-019B960494DF}">
-                <a14:hiddenLine xmlns:a14="http://schemas.microsoft.com/office/drawing/2010/main" xmlns="" w="9525">
+                <a14:hiddenLine xmlns="" xmlns:a14="http://schemas.microsoft.com/office/drawing/2010/main" w="9525">
                   <a:solidFill>
                     <a:srgbClr val="000000"/>
                   </a:solidFill>
@@ -1769,7 +1769,7 @@
             </a:ln>
             <a:extLst>
               <a:ext uri="{91240B29-F687-4f45-9708-019B960494DF}">
-                <a14:hiddenLine xmlns:a14="http://schemas.microsoft.com/office/drawing/2010/main" xmlns="" w="9525">
+                <a14:hiddenLine xmlns="" xmlns:a14="http://schemas.microsoft.com/office/drawing/2010/main" w="9525">
                   <a:solidFill>
                     <a:srgbClr val="000000"/>
                   </a:solidFill>
@@ -1831,7 +1831,7 @@
             </a:ln>
             <a:extLst>
               <a:ext uri="{91240B29-F687-4f45-9708-019B960494DF}">
-                <a14:hiddenLine xmlns:a14="http://schemas.microsoft.com/office/drawing/2010/main" xmlns="" w="9525">
+                <a14:hiddenLine xmlns="" xmlns:a14="http://schemas.microsoft.com/office/drawing/2010/main" w="9525">
                   <a:solidFill>
                     <a:srgbClr val="000000"/>
                   </a:solidFill>
@@ -1921,7 +1921,7 @@
             </a:ln>
             <a:extLst>
               <a:ext uri="{91240B29-F687-4f45-9708-019B960494DF}">
-                <a14:hiddenLine xmlns:a14="http://schemas.microsoft.com/office/drawing/2010/main" xmlns="" w="9525">
+                <a14:hiddenLine xmlns="" xmlns:a14="http://schemas.microsoft.com/office/drawing/2010/main" w="9525">
                   <a:solidFill>
                     <a:srgbClr val="000000"/>
                   </a:solidFill>
@@ -2011,7 +2011,7 @@
             </a:ln>
             <a:extLst>
               <a:ext uri="{91240B29-F687-4f45-9708-019B960494DF}">
-                <a14:hiddenLine xmlns:a14="http://schemas.microsoft.com/office/drawing/2010/main" xmlns="" w="9525">
+                <a14:hiddenLine xmlns="" xmlns:a14="http://schemas.microsoft.com/office/drawing/2010/main" w="9525">
                   <a:solidFill>
                     <a:srgbClr val="000000"/>
                   </a:solidFill>
@@ -2067,7 +2067,7 @@
             </a:ln>
             <a:extLst>
               <a:ext uri="{91240B29-F687-4f45-9708-019B960494DF}">
-                <a14:hiddenLine xmlns:a14="http://schemas.microsoft.com/office/drawing/2010/main" xmlns="" w="9525">
+                <a14:hiddenLine xmlns="" xmlns:a14="http://schemas.microsoft.com/office/drawing/2010/main" w="9525">
                   <a:solidFill>
                     <a:srgbClr val="000000"/>
                   </a:solidFill>
@@ -2157,7 +2157,7 @@
             </a:ln>
             <a:extLst>
               <a:ext uri="{91240B29-F687-4f45-9708-019B960494DF}">
-                <a14:hiddenLine xmlns:a14="http://schemas.microsoft.com/office/drawing/2010/main" xmlns="" w="9525">
+                <a14:hiddenLine xmlns="" xmlns:a14="http://schemas.microsoft.com/office/drawing/2010/main" w="9525">
                   <a:solidFill>
                     <a:srgbClr val="000000"/>
                   </a:solidFill>
@@ -2213,7 +2213,7 @@
             </a:ln>
             <a:extLst>
               <a:ext uri="{91240B29-F687-4f45-9708-019B960494DF}">
-                <a14:hiddenLine xmlns:a14="http://schemas.microsoft.com/office/drawing/2010/main" xmlns="" w="9525">
+                <a14:hiddenLine xmlns="" xmlns:a14="http://schemas.microsoft.com/office/drawing/2010/main" w="9525">
                   <a:solidFill>
                     <a:srgbClr val="000000"/>
                   </a:solidFill>
@@ -2303,7 +2303,7 @@
             </a:ln>
             <a:extLst>
               <a:ext uri="{91240B29-F687-4f45-9708-019B960494DF}">
-                <a14:hiddenLine xmlns:a14="http://schemas.microsoft.com/office/drawing/2010/main" xmlns="" w="9525">
+                <a14:hiddenLine xmlns="" xmlns:a14="http://schemas.microsoft.com/office/drawing/2010/main" w="9525">
                   <a:solidFill>
                     <a:srgbClr val="000000"/>
                   </a:solidFill>
@@ -2371,7 +2371,7 @@
             </a:ln>
             <a:extLst>
               <a:ext uri="{91240B29-F687-4f45-9708-019B960494DF}">
-                <a14:hiddenLine xmlns:a14="http://schemas.microsoft.com/office/drawing/2010/main" xmlns="" w="9525">
+                <a14:hiddenLine xmlns="" xmlns:a14="http://schemas.microsoft.com/office/drawing/2010/main" w="9525">
                   <a:solidFill>
                     <a:srgbClr val="000000"/>
                   </a:solidFill>
@@ -2461,7 +2461,7 @@
             </a:ln>
             <a:extLst>
               <a:ext uri="{91240B29-F687-4f45-9708-019B960494DF}">
-                <a14:hiddenLine xmlns:a14="http://schemas.microsoft.com/office/drawing/2010/main" xmlns="" w="9525">
+                <a14:hiddenLine xmlns="" xmlns:a14="http://schemas.microsoft.com/office/drawing/2010/main" w="9525">
                   <a:solidFill>
                     <a:srgbClr val="000000"/>
                   </a:solidFill>
@@ -2529,7 +2529,7 @@
             </a:ln>
             <a:extLst>
               <a:ext uri="{91240B29-F687-4f45-9708-019B960494DF}">
-                <a14:hiddenLine xmlns:a14="http://schemas.microsoft.com/office/drawing/2010/main" xmlns="" w="9525">
+                <a14:hiddenLine xmlns="" xmlns:a14="http://schemas.microsoft.com/office/drawing/2010/main" w="9525">
                   <a:solidFill>
                     <a:srgbClr val="000000"/>
                   </a:solidFill>
@@ -2619,7 +2619,7 @@
             </a:ln>
             <a:extLst>
               <a:ext uri="{91240B29-F687-4f45-9708-019B960494DF}">
-                <a14:hiddenLine xmlns:a14="http://schemas.microsoft.com/office/drawing/2010/main" xmlns="" w="9525">
+                <a14:hiddenLine xmlns="" xmlns:a14="http://schemas.microsoft.com/office/drawing/2010/main" w="9525">
                   <a:solidFill>
                     <a:srgbClr val="000000"/>
                   </a:solidFill>
@@ -2653,7 +2653,7 @@
             </a:ln>
             <a:extLst>
               <a:ext uri="{91240B29-F687-4f45-9708-019B960494DF}">
-                <a14:hiddenLine xmlns:a14="http://schemas.microsoft.com/office/drawing/2010/main" xmlns="" w="9525">
+                <a14:hiddenLine xmlns="" xmlns:a14="http://schemas.microsoft.com/office/drawing/2010/main" w="9525">
                   <a:solidFill>
                     <a:srgbClr val="000000"/>
                   </a:solidFill>
@@ -2743,7 +2743,7 @@
             </a:ln>
             <a:extLst>
               <a:ext uri="{91240B29-F687-4f45-9708-019B960494DF}">
-                <a14:hiddenLine xmlns:a14="http://schemas.microsoft.com/office/drawing/2010/main" xmlns="" w="9525">
+                <a14:hiddenLine xmlns="" xmlns:a14="http://schemas.microsoft.com/office/drawing/2010/main" w="9525">
                   <a:solidFill>
                     <a:srgbClr val="000000"/>
                   </a:solidFill>
@@ -2805,7 +2805,7 @@
             </a:ln>
             <a:extLst>
               <a:ext uri="{91240B29-F687-4f45-9708-019B960494DF}">
-                <a14:hiddenLine xmlns:a14="http://schemas.microsoft.com/office/drawing/2010/main" xmlns="" w="9525">
+                <a14:hiddenLine xmlns="" xmlns:a14="http://schemas.microsoft.com/office/drawing/2010/main" w="9525">
                   <a:solidFill>
                     <a:srgbClr val="000000"/>
                   </a:solidFill>
@@ -2867,7 +2867,7 @@
             </a:ln>
             <a:extLst>
               <a:ext uri="{91240B29-F687-4f45-9708-019B960494DF}">
-                <a14:hiddenLine xmlns:a14="http://schemas.microsoft.com/office/drawing/2010/main" xmlns="" w="9525">
+                <a14:hiddenLine xmlns="" xmlns:a14="http://schemas.microsoft.com/office/drawing/2010/main" w="9525">
                   <a:solidFill>
                     <a:srgbClr val="000000"/>
                   </a:solidFill>
@@ -2957,7 +2957,7 @@
             </a:ln>
             <a:extLst>
               <a:ext uri="{91240B29-F687-4f45-9708-019B960494DF}">
-                <a14:hiddenLine xmlns:a14="http://schemas.microsoft.com/office/drawing/2010/main" xmlns="" w="9525">
+                <a14:hiddenLine xmlns="" xmlns:a14="http://schemas.microsoft.com/office/drawing/2010/main" w="9525">
                   <a:solidFill>
                     <a:srgbClr val="000000"/>
                   </a:solidFill>
@@ -3025,7 +3025,7 @@
             </a:ln>
             <a:extLst>
               <a:ext uri="{91240B29-F687-4f45-9708-019B960494DF}">
-                <a14:hiddenLine xmlns:a14="http://schemas.microsoft.com/office/drawing/2010/main" xmlns="" w="9525">
+                <a14:hiddenLine xmlns="" xmlns:a14="http://schemas.microsoft.com/office/drawing/2010/main" w="9525">
                   <a:solidFill>
                     <a:srgbClr val="000000"/>
                   </a:solidFill>
@@ -3087,7 +3087,7 @@
             </a:ln>
             <a:extLst>
               <a:ext uri="{91240B29-F687-4f45-9708-019B960494DF}">
-                <a14:hiddenLine xmlns:a14="http://schemas.microsoft.com/office/drawing/2010/main" xmlns="" w="9525">
+                <a14:hiddenLine xmlns="" xmlns:a14="http://schemas.microsoft.com/office/drawing/2010/main" w="9525">
                   <a:solidFill>
                     <a:srgbClr val="000000"/>
                   </a:solidFill>
@@ -3177,7 +3177,7 @@
             </a:ln>
             <a:extLst>
               <a:ext uri="{91240B29-F687-4f45-9708-019B960494DF}">
-                <a14:hiddenLine xmlns:a14="http://schemas.microsoft.com/office/drawing/2010/main" xmlns="" w="9525">
+                <a14:hiddenLine xmlns="" xmlns:a14="http://schemas.microsoft.com/office/drawing/2010/main" w="9525">
                   <a:solidFill>
                     <a:srgbClr val="000000"/>
                   </a:solidFill>
@@ -3239,7 +3239,7 @@
             </a:ln>
             <a:extLst>
               <a:ext uri="{91240B29-F687-4f45-9708-019B960494DF}">
-                <a14:hiddenLine xmlns:a14="http://schemas.microsoft.com/office/drawing/2010/main" xmlns="" w="9525">
+                <a14:hiddenLine xmlns="" xmlns:a14="http://schemas.microsoft.com/office/drawing/2010/main" w="9525">
                   <a:solidFill>
                     <a:srgbClr val="000000"/>
                   </a:solidFill>
@@ -3329,7 +3329,7 @@
             </a:ln>
             <a:extLst>
               <a:ext uri="{91240B29-F687-4f45-9708-019B960494DF}">
-                <a14:hiddenLine xmlns:a14="http://schemas.microsoft.com/office/drawing/2010/main" xmlns="" w="9525">
+                <a14:hiddenLine xmlns="" xmlns:a14="http://schemas.microsoft.com/office/drawing/2010/main" w="9525">
                   <a:solidFill>
                     <a:srgbClr val="000000"/>
                   </a:solidFill>
@@ -3391,7 +3391,7 @@
             </a:ln>
             <a:extLst>
               <a:ext uri="{91240B29-F687-4f45-9708-019B960494DF}">
-                <a14:hiddenLine xmlns:a14="http://schemas.microsoft.com/office/drawing/2010/main" xmlns="" w="9525">
+                <a14:hiddenLine xmlns="" xmlns:a14="http://schemas.microsoft.com/office/drawing/2010/main" w="9525">
                   <a:solidFill>
                     <a:srgbClr val="000000"/>
                   </a:solidFill>
@@ -3481,7 +3481,7 @@
             </a:ln>
             <a:extLst>
               <a:ext uri="{91240B29-F687-4f45-9708-019B960494DF}">
-                <a14:hiddenLine xmlns:a14="http://schemas.microsoft.com/office/drawing/2010/main" xmlns="" w="9525">
+                <a14:hiddenLine xmlns="" xmlns:a14="http://schemas.microsoft.com/office/drawing/2010/main" w="9525">
                   <a:solidFill>
                     <a:srgbClr val="000000"/>
                   </a:solidFill>
@@ -3515,7 +3515,7 @@
             </a:ln>
             <a:extLst>
               <a:ext uri="{91240B29-F687-4f45-9708-019B960494DF}">
-                <a14:hiddenLine xmlns:a14="http://schemas.microsoft.com/office/drawing/2010/main" xmlns="" w="9525">
+                <a14:hiddenLine xmlns="" xmlns:a14="http://schemas.microsoft.com/office/drawing/2010/main" w="9525">
                   <a:solidFill>
                     <a:srgbClr val="000000"/>
                   </a:solidFill>
@@ -3580,7 +3580,7 @@
             </a:ln>
             <a:extLst>
               <a:ext uri="{91240B29-F687-4f45-9708-019B960494DF}">
-                <a14:hiddenLine xmlns:a14="http://schemas.microsoft.com/office/drawing/2010/main" xmlns="" w="9525">
+                <a14:hiddenLine xmlns="" xmlns:a14="http://schemas.microsoft.com/office/drawing/2010/main" w="9525">
                   <a:solidFill>
                     <a:srgbClr val="000000"/>
                   </a:solidFill>
@@ -3670,7 +3670,7 @@
             </a:ln>
             <a:extLst>
               <a:ext uri="{91240B29-F687-4f45-9708-019B960494DF}">
-                <a14:hiddenLine xmlns:a14="http://schemas.microsoft.com/office/drawing/2010/main" xmlns="" w="9525">
+                <a14:hiddenLine xmlns="" xmlns:a14="http://schemas.microsoft.com/office/drawing/2010/main" w="9525">
                   <a:solidFill>
                     <a:srgbClr val="000000"/>
                   </a:solidFill>
@@ -3732,7 +3732,7 @@
             </a:ln>
             <a:extLst>
               <a:ext uri="{91240B29-F687-4f45-9708-019B960494DF}">
-                <a14:hiddenLine xmlns:a14="http://schemas.microsoft.com/office/drawing/2010/main" xmlns="" w="9525">
+                <a14:hiddenLine xmlns="" xmlns:a14="http://schemas.microsoft.com/office/drawing/2010/main" w="9525">
                   <a:solidFill>
                     <a:srgbClr val="000000"/>
                   </a:solidFill>
@@ -3822,7 +3822,7 @@
             </a:ln>
             <a:extLst>
               <a:ext uri="{91240B29-F687-4f45-9708-019B960494DF}">
-                <a14:hiddenLine xmlns:a14="http://schemas.microsoft.com/office/drawing/2010/main" xmlns="" w="9525">
+                <a14:hiddenLine xmlns="" xmlns:a14="http://schemas.microsoft.com/office/drawing/2010/main" w="9525">
                   <a:solidFill>
                     <a:srgbClr val="000000"/>
                   </a:solidFill>
@@ -3912,7 +3912,7 @@
             </a:ln>
             <a:extLst>
               <a:ext uri="{91240B29-F687-4f45-9708-019B960494DF}">
-                <a14:hiddenLine xmlns:a14="http://schemas.microsoft.com/office/drawing/2010/main" xmlns="" w="9525">
+                <a14:hiddenLine xmlns="" xmlns:a14="http://schemas.microsoft.com/office/drawing/2010/main" w="9525">
                   <a:solidFill>
                     <a:srgbClr val="000000"/>
                   </a:solidFill>
@@ -3977,7 +3977,7 @@
             </a:ln>
             <a:extLst>
               <a:ext uri="{91240B29-F687-4f45-9708-019B960494DF}">
-                <a14:hiddenLine xmlns:a14="http://schemas.microsoft.com/office/drawing/2010/main" xmlns="" w="9525">
+                <a14:hiddenLine xmlns="" xmlns:a14="http://schemas.microsoft.com/office/drawing/2010/main" w="9525">
                   <a:solidFill>
                     <a:srgbClr val="000000"/>
                   </a:solidFill>
@@ -4039,7 +4039,7 @@
             </a:ln>
             <a:extLst>
               <a:ext uri="{91240B29-F687-4f45-9708-019B960494DF}">
-                <a14:hiddenLine xmlns:a14="http://schemas.microsoft.com/office/drawing/2010/main" xmlns="" w="9525">
+                <a14:hiddenLine xmlns="" xmlns:a14="http://schemas.microsoft.com/office/drawing/2010/main" w="9525">
                   <a:solidFill>
                     <a:srgbClr val="000000"/>
                   </a:solidFill>
@@ -4129,7 +4129,7 @@
             </a:ln>
             <a:extLst>
               <a:ext uri="{91240B29-F687-4f45-9708-019B960494DF}">
-                <a14:hiddenLine xmlns:a14="http://schemas.microsoft.com/office/drawing/2010/main" xmlns="" w="9525">
+                <a14:hiddenLine xmlns="" xmlns:a14="http://schemas.microsoft.com/office/drawing/2010/main" w="9525">
                   <a:solidFill>
                     <a:srgbClr val="000000"/>
                   </a:solidFill>
@@ -4219,7 +4219,7 @@
             </a:ln>
             <a:extLst>
               <a:ext uri="{91240B29-F687-4f45-9708-019B960494DF}">
-                <a14:hiddenLine xmlns:a14="http://schemas.microsoft.com/office/drawing/2010/main" xmlns="" w="9525">
+                <a14:hiddenLine xmlns="" xmlns:a14="http://schemas.microsoft.com/office/drawing/2010/main" w="9525">
                   <a:solidFill>
                     <a:srgbClr val="000000"/>
                   </a:solidFill>
@@ -4281,7 +4281,7 @@
             </a:ln>
             <a:extLst>
               <a:ext uri="{91240B29-F687-4f45-9708-019B960494DF}">
-                <a14:hiddenLine xmlns:a14="http://schemas.microsoft.com/office/drawing/2010/main" xmlns="" w="9525">
+                <a14:hiddenLine xmlns="" xmlns:a14="http://schemas.microsoft.com/office/drawing/2010/main" w="9525">
                   <a:solidFill>
                     <a:srgbClr val="000000"/>
                   </a:solidFill>
@@ -4401,7 +4401,7 @@
             </a:ln>
             <a:extLst>
               <a:ext uri="{91240B29-F687-4f45-9708-019B960494DF}">
-                <a14:hiddenLine xmlns:a14="http://schemas.microsoft.com/office/drawing/2010/main" xmlns="" w="9525">
+                <a14:hiddenLine xmlns="" xmlns:a14="http://schemas.microsoft.com/office/drawing/2010/main" w="9525">
                   <a:solidFill>
                     <a:srgbClr val="000000"/>
                   </a:solidFill>
@@ -4469,7 +4469,7 @@
             </a:ln>
             <a:extLst>
               <a:ext uri="{91240B29-F687-4f45-9708-019B960494DF}">
-                <a14:hiddenLine xmlns:a14="http://schemas.microsoft.com/office/drawing/2010/main" xmlns="" w="9525">
+                <a14:hiddenLine xmlns="" xmlns:a14="http://schemas.microsoft.com/office/drawing/2010/main" w="9525">
                   <a:solidFill>
                     <a:srgbClr val="000000"/>
                   </a:solidFill>
@@ -4559,7 +4559,7 @@
             </a:ln>
             <a:extLst>
               <a:ext uri="{91240B29-F687-4f45-9708-019B960494DF}">
-                <a14:hiddenLine xmlns:a14="http://schemas.microsoft.com/office/drawing/2010/main" xmlns="" w="9525">
+                <a14:hiddenLine xmlns="" xmlns:a14="http://schemas.microsoft.com/office/drawing/2010/main" w="9525">
                   <a:solidFill>
                     <a:srgbClr val="000000"/>
                   </a:solidFill>
@@ -4699,7 +4699,7 @@
           <a:p>
             <a:fld id="{48A87A34-81AB-432B-8DAE-1953F412C126}" type="datetimeFigureOut">
               <a:rPr lang="en-US" dirty="0"/>
-              <a:t>3/17/2022</a:t>
+              <a:t>3/18/2022</a:t>
             </a:fld>
             <a:endParaRPr lang="en-US" dirty="0"/>
           </a:p>
@@ -4964,7 +4964,7 @@
           <a:p>
             <a:fld id="{48A87A34-81AB-432B-8DAE-1953F412C126}" type="datetimeFigureOut">
               <a:rPr lang="en-US" dirty="0"/>
-              <a:t>3/17/2022</a:t>
+              <a:t>3/18/2022</a:t>
             </a:fld>
             <a:endParaRPr lang="en-US" dirty="0"/>
           </a:p>
@@ -5158,7 +5158,7 @@
           <a:p>
             <a:fld id="{48A87A34-81AB-432B-8DAE-1953F412C126}" type="datetimeFigureOut">
               <a:rPr lang="en-US" dirty="0"/>
-              <a:t>3/17/2022</a:t>
+              <a:t>3/18/2022</a:t>
             </a:fld>
             <a:endParaRPr lang="en-US" dirty="0"/>
           </a:p>
@@ -5419,7 +5419,7 @@
           <a:p>
             <a:fld id="{48A87A34-81AB-432B-8DAE-1953F412C126}" type="datetimeFigureOut">
               <a:rPr lang="en-US" dirty="0"/>
-              <a:t>3/17/2022</a:t>
+              <a:t>3/18/2022</a:t>
             </a:fld>
             <a:endParaRPr lang="en-US" dirty="0"/>
           </a:p>
@@ -5851,7 +5851,7 @@
           <a:p>
             <a:fld id="{48A87A34-81AB-432B-8DAE-1953F412C126}" type="datetimeFigureOut">
               <a:rPr lang="en-US" dirty="0"/>
-              <a:t>3/17/2022</a:t>
+              <a:t>3/18/2022</a:t>
             </a:fld>
             <a:endParaRPr lang="en-US" dirty="0"/>
           </a:p>
@@ -6395,7 +6395,7 @@
           <a:p>
             <a:fld id="{48A87A34-81AB-432B-8DAE-1953F412C126}" type="datetimeFigureOut">
               <a:rPr lang="en-US" dirty="0"/>
-              <a:t>3/17/2022</a:t>
+              <a:t>3/18/2022</a:t>
             </a:fld>
             <a:endParaRPr lang="en-US" dirty="0"/>
           </a:p>
@@ -7113,7 +7113,7 @@
           <a:p>
             <a:fld id="{48A87A34-81AB-432B-8DAE-1953F412C126}" type="datetimeFigureOut">
               <a:rPr lang="en-US" dirty="0"/>
-              <a:t>3/17/2022</a:t>
+              <a:t>3/18/2022</a:t>
             </a:fld>
             <a:endParaRPr lang="en-US" dirty="0"/>
           </a:p>
@@ -7281,7 +7281,7 @@
           <a:p>
             <a:fld id="{48A87A34-81AB-432B-8DAE-1953F412C126}" type="datetimeFigureOut">
               <a:rPr lang="en-US" dirty="0"/>
-              <a:t>3/17/2022</a:t>
+              <a:t>3/18/2022</a:t>
             </a:fld>
             <a:endParaRPr lang="en-US" dirty="0"/>
           </a:p>
@@ -7459,7 +7459,7 @@
           <a:p>
             <a:fld id="{48A87A34-81AB-432B-8DAE-1953F412C126}" type="datetimeFigureOut">
               <a:rPr lang="en-US" dirty="0"/>
-              <a:t>3/17/2022</a:t>
+              <a:t>3/18/2022</a:t>
             </a:fld>
             <a:endParaRPr lang="en-US" dirty="0"/>
           </a:p>
@@ -7627,7 +7627,7 @@
           <a:p>
             <a:fld id="{48A87A34-81AB-432B-8DAE-1953F412C126}" type="datetimeFigureOut">
               <a:rPr lang="en-US" dirty="0"/>
-              <a:t>3/17/2022</a:t>
+              <a:t>3/18/2022</a:t>
             </a:fld>
             <a:endParaRPr lang="en-US" dirty="0"/>
           </a:p>
@@ -7875,7 +7875,7 @@
           <a:p>
             <a:fld id="{48A87A34-81AB-432B-8DAE-1953F412C126}" type="datetimeFigureOut">
               <a:rPr lang="en-US" dirty="0"/>
-              <a:t>3/17/2022</a:t>
+              <a:t>3/18/2022</a:t>
             </a:fld>
             <a:endParaRPr lang="en-US" dirty="0"/>
           </a:p>
@@ -8105,7 +8105,7 @@
           <a:p>
             <a:fld id="{48A87A34-81AB-432B-8DAE-1953F412C126}" type="datetimeFigureOut">
               <a:rPr lang="en-US" dirty="0"/>
-              <a:t>3/17/2022</a:t>
+              <a:t>3/18/2022</a:t>
             </a:fld>
             <a:endParaRPr lang="en-US" dirty="0"/>
           </a:p>
@@ -8484,7 +8484,7 @@
           <a:p>
             <a:fld id="{48A87A34-81AB-432B-8DAE-1953F412C126}" type="datetimeFigureOut">
               <a:rPr lang="en-US" dirty="0"/>
-              <a:t>3/17/2022</a:t>
+              <a:t>3/18/2022</a:t>
             </a:fld>
             <a:endParaRPr lang="en-US" dirty="0"/>
           </a:p>
@@ -8600,7 +8600,7 @@
           <a:p>
             <a:fld id="{48A87A34-81AB-432B-8DAE-1953F412C126}" type="datetimeFigureOut">
               <a:rPr lang="en-US" dirty="0"/>
-              <a:t>3/17/2022</a:t>
+              <a:t>3/18/2022</a:t>
             </a:fld>
             <a:endParaRPr lang="en-US" dirty="0"/>
           </a:p>
@@ -8693,7 +8693,7 @@
           <a:p>
             <a:fld id="{48A87A34-81AB-432B-8DAE-1953F412C126}" type="datetimeFigureOut">
               <a:rPr lang="en-US" dirty="0"/>
-              <a:t>3/17/2022</a:t>
+              <a:t>3/18/2022</a:t>
             </a:fld>
             <a:endParaRPr lang="en-US" dirty="0"/>
           </a:p>
@@ -8940,7 +8940,7 @@
           <a:p>
             <a:fld id="{48A87A34-81AB-432B-8DAE-1953F412C126}" type="datetimeFigureOut">
               <a:rPr lang="en-US" dirty="0"/>
-              <a:t>3/17/2022</a:t>
+              <a:t>3/18/2022</a:t>
             </a:fld>
             <a:endParaRPr lang="en-US" dirty="0"/>
           </a:p>
@@ -9218,7 +9218,7 @@
           <a:p>
             <a:fld id="{48A87A34-81AB-432B-8DAE-1953F412C126}" type="datetimeFigureOut">
               <a:rPr lang="en-US" dirty="0"/>
-              <a:t>3/17/2022</a:t>
+              <a:t>3/18/2022</a:t>
             </a:fld>
             <a:endParaRPr lang="en-US" dirty="0"/>
           </a:p>
@@ -9378,7 +9378,7 @@
           <a:noFill/>
           <a:extLst>
             <a:ext uri="{909E8E84-426E-40dd-AFC4-6F175D3DCCD1}">
-              <a14:hiddenFill xmlns:a14="http://schemas.microsoft.com/office/drawing/2010/main" xmlns="">
+              <a14:hiddenFill xmlns="" xmlns:a14="http://schemas.microsoft.com/office/drawing/2010/main">
                 <a:solidFill>
                   <a:srgbClr val="FFFFFF"/>
                 </a:solidFill>
@@ -9452,7 +9452,7 @@
               </a:ln>
               <a:extLst>
                 <a:ext uri="{91240B29-F687-4f45-9708-019B960494DF}">
-                  <a14:hiddenLine xmlns:a14="http://schemas.microsoft.com/office/drawing/2010/main" xmlns="" w="9525">
+                  <a14:hiddenLine xmlns="" xmlns:a14="http://schemas.microsoft.com/office/drawing/2010/main" w="9525">
                     <a:solidFill>
                       <a:srgbClr val="000000"/>
                     </a:solidFill>
@@ -9542,7 +9542,7 @@
               </a:ln>
               <a:extLst>
                 <a:ext uri="{91240B29-F687-4f45-9708-019B960494DF}">
-                  <a14:hiddenLine xmlns:a14="http://schemas.microsoft.com/office/drawing/2010/main" xmlns="" w="9525">
+                  <a14:hiddenLine xmlns="" xmlns:a14="http://schemas.microsoft.com/office/drawing/2010/main" w="9525">
                     <a:solidFill>
                       <a:srgbClr val="000000"/>
                     </a:solidFill>
@@ -9632,7 +9632,7 @@
               </a:ln>
               <a:extLst>
                 <a:ext uri="{91240B29-F687-4f45-9708-019B960494DF}">
-                  <a14:hiddenLine xmlns:a14="http://schemas.microsoft.com/office/drawing/2010/main" xmlns="" w="9525">
+                  <a14:hiddenLine xmlns="" xmlns:a14="http://schemas.microsoft.com/office/drawing/2010/main" w="9525">
                     <a:solidFill>
                       <a:srgbClr val="000000"/>
                     </a:solidFill>
@@ -9694,7 +9694,7 @@
               </a:ln>
               <a:extLst>
                 <a:ext uri="{91240B29-F687-4f45-9708-019B960494DF}">
-                  <a14:hiddenLine xmlns:a14="http://schemas.microsoft.com/office/drawing/2010/main" xmlns="" w="9525">
+                  <a14:hiddenLine xmlns="" xmlns:a14="http://schemas.microsoft.com/office/drawing/2010/main" w="9525">
                     <a:solidFill>
                       <a:srgbClr val="000000"/>
                     </a:solidFill>
@@ -9784,7 +9784,7 @@
               </a:ln>
               <a:extLst>
                 <a:ext uri="{91240B29-F687-4f45-9708-019B960494DF}">
-                  <a14:hiddenLine xmlns:a14="http://schemas.microsoft.com/office/drawing/2010/main" xmlns="" w="9525">
+                  <a14:hiddenLine xmlns="" xmlns:a14="http://schemas.microsoft.com/office/drawing/2010/main" w="9525">
                     <a:solidFill>
                       <a:srgbClr val="000000"/>
                     </a:solidFill>
@@ -9846,7 +9846,7 @@
               </a:ln>
               <a:extLst>
                 <a:ext uri="{91240B29-F687-4f45-9708-019B960494DF}">
-                  <a14:hiddenLine xmlns:a14="http://schemas.microsoft.com/office/drawing/2010/main" xmlns="" w="9525">
+                  <a14:hiddenLine xmlns="" xmlns:a14="http://schemas.microsoft.com/office/drawing/2010/main" w="9525">
                     <a:solidFill>
                       <a:srgbClr val="000000"/>
                     </a:solidFill>
@@ -9908,7 +9908,7 @@
               </a:ln>
               <a:extLst>
                 <a:ext uri="{91240B29-F687-4f45-9708-019B960494DF}">
-                  <a14:hiddenLine xmlns:a14="http://schemas.microsoft.com/office/drawing/2010/main" xmlns="" w="9525">
+                  <a14:hiddenLine xmlns="" xmlns:a14="http://schemas.microsoft.com/office/drawing/2010/main" w="9525">
                     <a:solidFill>
                       <a:srgbClr val="000000"/>
                     </a:solidFill>
@@ -9998,7 +9998,7 @@
               </a:ln>
               <a:extLst>
                 <a:ext uri="{91240B29-F687-4f45-9708-019B960494DF}">
-                  <a14:hiddenLine xmlns:a14="http://schemas.microsoft.com/office/drawing/2010/main" xmlns="" w="9525">
+                  <a14:hiddenLine xmlns="" xmlns:a14="http://schemas.microsoft.com/office/drawing/2010/main" w="9525">
                     <a:solidFill>
                       <a:srgbClr val="000000"/>
                     </a:solidFill>
@@ -10088,7 +10088,7 @@
               </a:ln>
               <a:extLst>
                 <a:ext uri="{91240B29-F687-4f45-9708-019B960494DF}">
-                  <a14:hiddenLine xmlns:a14="http://schemas.microsoft.com/office/drawing/2010/main" xmlns="" w="9525">
+                  <a14:hiddenLine xmlns="" xmlns:a14="http://schemas.microsoft.com/office/drawing/2010/main" w="9525">
                     <a:solidFill>
                       <a:srgbClr val="000000"/>
                     </a:solidFill>
@@ -10150,7 +10150,7 @@
               </a:ln>
               <a:extLst>
                 <a:ext uri="{91240B29-F687-4f45-9708-019B960494DF}">
-                  <a14:hiddenLine xmlns:a14="http://schemas.microsoft.com/office/drawing/2010/main" xmlns="" w="9525">
+                  <a14:hiddenLine xmlns="" xmlns:a14="http://schemas.microsoft.com/office/drawing/2010/main" w="9525">
                     <a:solidFill>
                       <a:srgbClr val="000000"/>
                     </a:solidFill>
@@ -10260,7 +10260,7 @@
               </a:ln>
               <a:extLst>
                 <a:ext uri="{91240B29-F687-4f45-9708-019B960494DF}">
-                  <a14:hiddenLine xmlns:a14="http://schemas.microsoft.com/office/drawing/2010/main" xmlns="" w="9525">
+                  <a14:hiddenLine xmlns="" xmlns:a14="http://schemas.microsoft.com/office/drawing/2010/main" w="9525">
                     <a:solidFill>
                       <a:srgbClr val="000000"/>
                     </a:solidFill>
@@ -10344,7 +10344,7 @@
               </a:ln>
               <a:extLst>
                 <a:ext uri="{91240B29-F687-4f45-9708-019B960494DF}">
-                  <a14:hiddenLine xmlns:a14="http://schemas.microsoft.com/office/drawing/2010/main" xmlns="" w="9525">
+                  <a14:hiddenLine xmlns="" xmlns:a14="http://schemas.microsoft.com/office/drawing/2010/main" w="9525">
                     <a:solidFill>
                       <a:srgbClr val="000000"/>
                     </a:solidFill>
@@ -10406,7 +10406,7 @@
               </a:ln>
               <a:extLst>
                 <a:ext uri="{91240B29-F687-4f45-9708-019B960494DF}">
-                  <a14:hiddenLine xmlns:a14="http://schemas.microsoft.com/office/drawing/2010/main" xmlns="" w="9525">
+                  <a14:hiddenLine xmlns="" xmlns:a14="http://schemas.microsoft.com/office/drawing/2010/main" w="9525">
                     <a:solidFill>
                       <a:srgbClr val="000000"/>
                     </a:solidFill>
@@ -10468,7 +10468,7 @@
               </a:ln>
               <a:extLst>
                 <a:ext uri="{91240B29-F687-4f45-9708-019B960494DF}">
-                  <a14:hiddenLine xmlns:a14="http://schemas.microsoft.com/office/drawing/2010/main" xmlns="" w="9525">
+                  <a14:hiddenLine xmlns="" xmlns:a14="http://schemas.microsoft.com/office/drawing/2010/main" w="9525">
                     <a:solidFill>
                       <a:srgbClr val="000000"/>
                     </a:solidFill>
@@ -10558,7 +10558,7 @@
               </a:ln>
               <a:extLst>
                 <a:ext uri="{91240B29-F687-4f45-9708-019B960494DF}">
-                  <a14:hiddenLine xmlns:a14="http://schemas.microsoft.com/office/drawing/2010/main" xmlns="" w="9525">
+                  <a14:hiddenLine xmlns="" xmlns:a14="http://schemas.microsoft.com/office/drawing/2010/main" w="9525">
                     <a:solidFill>
                       <a:srgbClr val="000000"/>
                     </a:solidFill>
@@ -10592,7 +10592,7 @@
               </a:ln>
               <a:extLst>
                 <a:ext uri="{91240B29-F687-4f45-9708-019B960494DF}">
-                  <a14:hiddenLine xmlns:a14="http://schemas.microsoft.com/office/drawing/2010/main" xmlns="" w="9525">
+                  <a14:hiddenLine xmlns="" xmlns:a14="http://schemas.microsoft.com/office/drawing/2010/main" w="9525">
                     <a:solidFill>
                       <a:srgbClr val="000000"/>
                     </a:solidFill>
@@ -10657,7 +10657,7 @@
               </a:ln>
               <a:extLst>
                 <a:ext uri="{91240B29-F687-4f45-9708-019B960494DF}">
-                  <a14:hiddenLine xmlns:a14="http://schemas.microsoft.com/office/drawing/2010/main" xmlns="" w="9525">
+                  <a14:hiddenLine xmlns="" xmlns:a14="http://schemas.microsoft.com/office/drawing/2010/main" w="9525">
                     <a:solidFill>
                       <a:srgbClr val="000000"/>
                     </a:solidFill>
@@ -10747,7 +10747,7 @@
               </a:ln>
               <a:extLst>
                 <a:ext uri="{91240B29-F687-4f45-9708-019B960494DF}">
-                  <a14:hiddenLine xmlns:a14="http://schemas.microsoft.com/office/drawing/2010/main" xmlns="" w="9525">
+                  <a14:hiddenLine xmlns="" xmlns:a14="http://schemas.microsoft.com/office/drawing/2010/main" w="9525">
                     <a:solidFill>
                       <a:srgbClr val="000000"/>
                     </a:solidFill>
@@ -10809,7 +10809,7 @@
               </a:ln>
               <a:extLst>
                 <a:ext uri="{91240B29-F687-4f45-9708-019B960494DF}">
-                  <a14:hiddenLine xmlns:a14="http://schemas.microsoft.com/office/drawing/2010/main" xmlns="" w="9525">
+                  <a14:hiddenLine xmlns="" xmlns:a14="http://schemas.microsoft.com/office/drawing/2010/main" w="9525">
                     <a:solidFill>
                       <a:srgbClr val="000000"/>
                     </a:solidFill>
@@ -10899,7 +10899,7 @@
               </a:ln>
               <a:extLst>
                 <a:ext uri="{91240B29-F687-4f45-9708-019B960494DF}">
-                  <a14:hiddenLine xmlns:a14="http://schemas.microsoft.com/office/drawing/2010/main" xmlns="" w="9525">
+                  <a14:hiddenLine xmlns="" xmlns:a14="http://schemas.microsoft.com/office/drawing/2010/main" w="9525">
                     <a:solidFill>
                       <a:srgbClr val="000000"/>
                     </a:solidFill>
@@ -10964,7 +10964,7 @@
               </a:ln>
               <a:extLst>
                 <a:ext uri="{91240B29-F687-4f45-9708-019B960494DF}">
-                  <a14:hiddenLine xmlns:a14="http://schemas.microsoft.com/office/drawing/2010/main" xmlns="" w="9525">
+                  <a14:hiddenLine xmlns="" xmlns:a14="http://schemas.microsoft.com/office/drawing/2010/main" w="9525">
                     <a:solidFill>
                       <a:srgbClr val="000000"/>
                     </a:solidFill>
@@ -11026,7 +11026,7 @@
               </a:ln>
               <a:extLst>
                 <a:ext uri="{91240B29-F687-4f45-9708-019B960494DF}">
-                  <a14:hiddenLine xmlns:a14="http://schemas.microsoft.com/office/drawing/2010/main" xmlns="" w="9525">
+                  <a14:hiddenLine xmlns="" xmlns:a14="http://schemas.microsoft.com/office/drawing/2010/main" w="9525">
                     <a:solidFill>
                       <a:srgbClr val="000000"/>
                     </a:solidFill>
@@ -11116,7 +11116,7 @@
               </a:ln>
               <a:extLst>
                 <a:ext uri="{91240B29-F687-4f45-9708-019B960494DF}">
-                  <a14:hiddenLine xmlns:a14="http://schemas.microsoft.com/office/drawing/2010/main" xmlns="" w="9525">
+                  <a14:hiddenLine xmlns="" xmlns:a14="http://schemas.microsoft.com/office/drawing/2010/main" w="9525">
                     <a:solidFill>
                       <a:srgbClr val="000000"/>
                     </a:solidFill>
@@ -11206,7 +11206,7 @@
               </a:ln>
               <a:extLst>
                 <a:ext uri="{91240B29-F687-4f45-9708-019B960494DF}">
-                  <a14:hiddenLine xmlns:a14="http://schemas.microsoft.com/office/drawing/2010/main" xmlns="" w="9525">
+                  <a14:hiddenLine xmlns="" xmlns:a14="http://schemas.microsoft.com/office/drawing/2010/main" w="9525">
                     <a:solidFill>
                       <a:srgbClr val="000000"/>
                     </a:solidFill>
@@ -11271,7 +11271,7 @@
               </a:ln>
               <a:extLst>
                 <a:ext uri="{91240B29-F687-4f45-9708-019B960494DF}">
-                  <a14:hiddenLine xmlns:a14="http://schemas.microsoft.com/office/drawing/2010/main" xmlns="" w="9525">
+                  <a14:hiddenLine xmlns="" xmlns:a14="http://schemas.microsoft.com/office/drawing/2010/main" w="9525">
                     <a:solidFill>
                       <a:srgbClr val="000000"/>
                     </a:solidFill>
@@ -11391,7 +11391,7 @@
               </a:ln>
               <a:extLst>
                 <a:ext uri="{91240B29-F687-4f45-9708-019B960494DF}">
-                  <a14:hiddenLine xmlns:a14="http://schemas.microsoft.com/office/drawing/2010/main" xmlns="" w="9525">
+                  <a14:hiddenLine xmlns="" xmlns:a14="http://schemas.microsoft.com/office/drawing/2010/main" w="9525">
                     <a:solidFill>
                       <a:srgbClr val="000000"/>
                     </a:solidFill>
@@ -11489,7 +11489,7 @@
               </a:ln>
               <a:extLst>
                 <a:ext uri="{91240B29-F687-4f45-9708-019B960494DF}">
-                  <a14:hiddenLine xmlns:a14="http://schemas.microsoft.com/office/drawing/2010/main" xmlns="" w="9525">
+                  <a14:hiddenLine xmlns="" xmlns:a14="http://schemas.microsoft.com/office/drawing/2010/main" w="9525">
                     <a:solidFill>
                       <a:srgbClr val="000000"/>
                     </a:solidFill>
@@ -11604,7 +11604,7 @@
               </a:ln>
               <a:extLst>
                 <a:ext uri="{91240B29-F687-4f45-9708-019B960494DF}">
-                  <a14:hiddenLine xmlns:a14="http://schemas.microsoft.com/office/drawing/2010/main" xmlns="" w="9525">
+                  <a14:hiddenLine xmlns="" xmlns:a14="http://schemas.microsoft.com/office/drawing/2010/main" w="9525">
                     <a:solidFill>
                       <a:srgbClr val="000000"/>
                     </a:solidFill>
@@ -11694,7 +11694,7 @@
               </a:ln>
               <a:extLst>
                 <a:ext uri="{91240B29-F687-4f45-9708-019B960494DF}">
-                  <a14:hiddenLine xmlns:a14="http://schemas.microsoft.com/office/drawing/2010/main" xmlns="" w="9525">
+                  <a14:hiddenLine xmlns="" xmlns:a14="http://schemas.microsoft.com/office/drawing/2010/main" w="9525">
                     <a:solidFill>
                       <a:srgbClr val="000000"/>
                     </a:solidFill>
@@ -11759,7 +11759,7 @@
               </a:ln>
               <a:extLst>
                 <a:ext uri="{91240B29-F687-4f45-9708-019B960494DF}">
-                  <a14:hiddenLine xmlns:a14="http://schemas.microsoft.com/office/drawing/2010/main" xmlns="" w="9525">
+                  <a14:hiddenLine xmlns="" xmlns:a14="http://schemas.microsoft.com/office/drawing/2010/main" w="9525">
                     <a:solidFill>
                       <a:srgbClr val="000000"/>
                     </a:solidFill>
@@ -11849,7 +11849,7 @@
               </a:ln>
               <a:extLst>
                 <a:ext uri="{91240B29-F687-4f45-9708-019B960494DF}">
-                  <a14:hiddenLine xmlns:a14="http://schemas.microsoft.com/office/drawing/2010/main" xmlns="" w="9525">
+                  <a14:hiddenLine xmlns="" xmlns:a14="http://schemas.microsoft.com/office/drawing/2010/main" w="9525">
                     <a:solidFill>
                       <a:srgbClr val="000000"/>
                     </a:solidFill>
@@ -11917,7 +11917,7 @@
               </a:ln>
               <a:extLst>
                 <a:ext uri="{91240B29-F687-4f45-9708-019B960494DF}">
-                  <a14:hiddenLine xmlns:a14="http://schemas.microsoft.com/office/drawing/2010/main" xmlns="" w="9525">
+                  <a14:hiddenLine xmlns="" xmlns:a14="http://schemas.microsoft.com/office/drawing/2010/main" w="9525">
                     <a:solidFill>
                       <a:srgbClr val="000000"/>
                     </a:solidFill>
@@ -12007,7 +12007,7 @@
               </a:ln>
               <a:extLst>
                 <a:ext uri="{91240B29-F687-4f45-9708-019B960494DF}">
-                  <a14:hiddenLine xmlns:a14="http://schemas.microsoft.com/office/drawing/2010/main" xmlns="" w="9525">
+                  <a14:hiddenLine xmlns="" xmlns:a14="http://schemas.microsoft.com/office/drawing/2010/main" w="9525">
                     <a:solidFill>
                       <a:srgbClr val="000000"/>
                     </a:solidFill>
@@ -12075,7 +12075,7 @@
               </a:ln>
               <a:extLst>
                 <a:ext uri="{91240B29-F687-4f45-9708-019B960494DF}">
-                  <a14:hiddenLine xmlns:a14="http://schemas.microsoft.com/office/drawing/2010/main" xmlns="" w="9525">
+                  <a14:hiddenLine xmlns="" xmlns:a14="http://schemas.microsoft.com/office/drawing/2010/main" w="9525">
                     <a:solidFill>
                       <a:srgbClr val="000000"/>
                     </a:solidFill>
@@ -12165,7 +12165,7 @@
               </a:ln>
               <a:extLst>
                 <a:ext uri="{91240B29-F687-4f45-9708-019B960494DF}">
-                  <a14:hiddenLine xmlns:a14="http://schemas.microsoft.com/office/drawing/2010/main" xmlns="" w="9525">
+                  <a14:hiddenLine xmlns="" xmlns:a14="http://schemas.microsoft.com/office/drawing/2010/main" w="9525">
                     <a:solidFill>
                       <a:srgbClr val="000000"/>
                     </a:solidFill>
@@ -12199,7 +12199,7 @@
               </a:ln>
               <a:extLst>
                 <a:ext uri="{91240B29-F687-4f45-9708-019B960494DF}">
-                  <a14:hiddenLine xmlns:a14="http://schemas.microsoft.com/office/drawing/2010/main" xmlns="" w="9525">
+                  <a14:hiddenLine xmlns="" xmlns:a14="http://schemas.microsoft.com/office/drawing/2010/main" w="9525">
                     <a:solidFill>
                       <a:srgbClr val="000000"/>
                     </a:solidFill>
@@ -12340,7 +12340,7 @@
             <a:fld id="{48A87A34-81AB-432B-8DAE-1953F412C126}" type="datetimeFigureOut">
               <a:rPr lang="en-US" dirty="0"/>
               <a:pPr/>
-              <a:t>3/17/2022</a:t>
+              <a:t>3/18/2022</a:t>
             </a:fld>
             <a:endParaRPr lang="en-US" dirty="0"/>
           </a:p>
@@ -12906,20 +12906,22 @@
             <p:ph type="title"/>
           </p:nvPr>
         </p:nvSpPr>
-        <p:spPr/>
+        <p:spPr>
+          <a:xfrm>
+            <a:off x="1143001" y="0"/>
+            <a:ext cx="9905998" cy="1921565"/>
+          </a:xfrm>
+        </p:spPr>
         <p:txBody>
-          <a:bodyPr/>
+          <a:bodyPr>
+            <a:normAutofit/>
+          </a:bodyPr>
           <a:lstStyle/>
           <a:p>
             <a:r>
-              <a:rPr lang="en-US" dirty="0"/>
-              <a:t>What is a JSON </a:t>
-            </a:r>
-            <a:r>
-              <a:rPr lang="en-US" dirty="0" err="1"/>
-              <a:t>fileS</a:t>
-            </a:r>
-            <a:endParaRPr lang="en-US" dirty="0"/>
+              <a:rPr lang="en-US" sz="6000" dirty="0"/>
+              <a:t>What is a JSON files</a:t>
+            </a:r>
           </a:p>
         </p:txBody>
       </p:sp>
@@ -12941,15 +12943,17 @@
         </p:nvSpPr>
         <p:spPr/>
         <p:txBody>
-          <a:bodyPr/>
+          <a:bodyPr>
+            <a:normAutofit/>
+          </a:bodyPr>
           <a:lstStyle/>
           <a:p>
             <a:pPr marL="0" indent="0">
               <a:buNone/>
             </a:pPr>
             <a:r>
-              <a:rPr lang="en-US" dirty="0"/>
-              <a:t>JSON file is a file that hold data for other files to soon later read and may import more data in the files that might be better or not be better but it can do that.</a:t>
+              <a:rPr lang="en-US" sz="4000" dirty="0"/>
+              <a:t>JSON file Is a File containing and Holding Data for other application to soon later access the data or replace the data. The usual type of data it contains is arrays and Lists.</a:t>
             </a:r>
           </a:p>
         </p:txBody>
@@ -12971,92 +12975,6 @@
 </file>
 
 <file path=ppt/slides/slide3.xml><?xml version="1.0" encoding="utf-8"?>
-<p:sld xmlns:a="http://schemas.openxmlformats.org/drawingml/2006/main" xmlns:r="http://schemas.openxmlformats.org/officeDocument/2006/relationships" xmlns:p="http://schemas.openxmlformats.org/presentationml/2006/main">
-  <p:cSld>
-    <p:spTree>
-      <p:nvGrpSpPr>
-        <p:cNvPr id="1" name=""/>
-        <p:cNvGrpSpPr/>
-        <p:nvPr/>
-      </p:nvGrpSpPr>
-      <p:grpSpPr>
-        <a:xfrm>
-          <a:off x="0" y="0"/>
-          <a:ext cx="0" cy="0"/>
-          <a:chOff x="0" y="0"/>
-          <a:chExt cx="0" cy="0"/>
-        </a:xfrm>
-      </p:grpSpPr>
-      <p:sp>
-        <p:nvSpPr>
-          <p:cNvPr id="2" name="Title 1">
-            <a:extLst>
-              <a:ext uri="{FF2B5EF4-FFF2-40B4-BE49-F238E27FC236}">
-                <a16:creationId xmlns:a16="http://schemas.microsoft.com/office/drawing/2014/main" id="{F7B2DB2D-370F-4DC4-BA86-E794188A6B4F}"/>
-              </a:ext>
-            </a:extLst>
-          </p:cNvPr>
-          <p:cNvSpPr>
-            <a:spLocks noGrp="1"/>
-          </p:cNvSpPr>
-          <p:nvPr>
-            <p:ph type="title"/>
-          </p:nvPr>
-        </p:nvSpPr>
-        <p:spPr/>
-        <p:txBody>
-          <a:bodyPr/>
-          <a:lstStyle/>
-          <a:p>
-            <a:r>
-              <a:rPr lang="en-US" dirty="0"/>
-              <a:t>Data that json file uses</a:t>
-            </a:r>
-          </a:p>
-        </p:txBody>
-      </p:sp>
-      <p:sp>
-        <p:nvSpPr>
-          <p:cNvPr id="3" name="Content Placeholder 2">
-            <a:extLst>
-              <a:ext uri="{FF2B5EF4-FFF2-40B4-BE49-F238E27FC236}">
-                <a16:creationId xmlns:a16="http://schemas.microsoft.com/office/drawing/2014/main" id="{9BDD9D1D-1512-402A-A18B-225AD0AC12A8}"/>
-              </a:ext>
-            </a:extLst>
-          </p:cNvPr>
-          <p:cNvSpPr>
-            <a:spLocks noGrp="1"/>
-          </p:cNvSpPr>
-          <p:nvPr>
-            <p:ph idx="1"/>
-          </p:nvPr>
-        </p:nvSpPr>
-        <p:spPr/>
-        <p:txBody>
-          <a:bodyPr/>
-          <a:lstStyle/>
-          <a:p>
-            <a:endParaRPr lang="en-US" dirty="0"/>
-          </a:p>
-        </p:txBody>
-      </p:sp>
-    </p:spTree>
-    <p:extLst>
-      <p:ext uri="{BB962C8B-B14F-4D97-AF65-F5344CB8AC3E}">
-        <p14:creationId xmlns:p14="http://schemas.microsoft.com/office/powerpoint/2010/main" val="1270365414"/>
-      </p:ext>
-    </p:extLst>
-  </p:cSld>
-  <p:clrMapOvr>
-    <a:masterClrMapping/>
-  </p:clrMapOvr>
-  <p:transition spd="slow">
-    <p:push dir="u"/>
-  </p:transition>
-</p:sld>
-</file>
-
-<file path=ppt/slides/slide4.xml><?xml version="1.0" encoding="utf-8"?>
 <p:sld xmlns:a="http://schemas.openxmlformats.org/drawingml/2006/main" xmlns:r="http://schemas.openxmlformats.org/officeDocument/2006/relationships" xmlns:p="http://schemas.openxmlformats.org/presentationml/2006/main">
   <p:cSld>
     <p:spTree>
@@ -13197,7 +13115,7 @@
 </p:sld>
 </file>
 
-<file path=ppt/slides/slide5.xml><?xml version="1.0" encoding="utf-8"?>
+<file path=ppt/slides/slide4.xml><?xml version="1.0" encoding="utf-8"?>
 <p:sld xmlns:a="http://schemas.openxmlformats.org/drawingml/2006/main" xmlns:r="http://schemas.openxmlformats.org/officeDocument/2006/relationships" xmlns:p="http://schemas.openxmlformats.org/presentationml/2006/main">
   <p:cSld>
     <p:spTree>
@@ -13376,7 +13294,7 @@
 </p:sld>
 </file>
 
-<file path=ppt/slides/slide6.xml><?xml version="1.0" encoding="utf-8"?>
+<file path=ppt/slides/slide5.xml><?xml version="1.0" encoding="utf-8"?>
 <p:sld xmlns:a="http://schemas.openxmlformats.org/drawingml/2006/main" xmlns:r="http://schemas.openxmlformats.org/officeDocument/2006/relationships" xmlns:p="http://schemas.openxmlformats.org/presentationml/2006/main">
   <p:cSld>
     <p:spTree>
@@ -13566,7 +13484,7 @@
 </p:sld>
 </file>
 
-<file path=ppt/slides/slide7.xml><?xml version="1.0" encoding="utf-8"?>
+<file path=ppt/slides/slide6.xml><?xml version="1.0" encoding="utf-8"?>
 <p:sld xmlns:a="http://schemas.openxmlformats.org/drawingml/2006/main" xmlns:r="http://schemas.openxmlformats.org/officeDocument/2006/relationships" xmlns:p="http://schemas.openxmlformats.org/presentationml/2006/main">
   <p:cSld>
     <p:spTree>
@@ -13675,6 +13593,187 @@
     <p:extLst>
       <p:ext uri="{BB962C8B-B14F-4D97-AF65-F5344CB8AC3E}">
         <p14:creationId xmlns:p14="http://schemas.microsoft.com/office/powerpoint/2010/main" val="4221514207"/>
+      </p:ext>
+    </p:extLst>
+  </p:cSld>
+  <p:clrMapOvr>
+    <a:masterClrMapping/>
+  </p:clrMapOvr>
+  <p:transition spd="slow">
+    <p:push dir="u"/>
+  </p:transition>
+</p:sld>
+</file>
+
+<file path=ppt/slides/slide7.xml><?xml version="1.0" encoding="utf-8"?>
+<p:sld xmlns:a="http://schemas.openxmlformats.org/drawingml/2006/main" xmlns:r="http://schemas.openxmlformats.org/officeDocument/2006/relationships" xmlns:p="http://schemas.openxmlformats.org/presentationml/2006/main">
+  <p:cSld>
+    <p:spTree>
+      <p:nvGrpSpPr>
+        <p:cNvPr id="1" name=""/>
+        <p:cNvGrpSpPr/>
+        <p:nvPr/>
+      </p:nvGrpSpPr>
+      <p:grpSpPr>
+        <a:xfrm>
+          <a:off x="0" y="0"/>
+          <a:ext cx="0" cy="0"/>
+          <a:chOff x="0" y="0"/>
+          <a:chExt cx="0" cy="0"/>
+        </a:xfrm>
+      </p:grpSpPr>
+      <p:sp>
+        <p:nvSpPr>
+          <p:cNvPr id="2" name="Title 1">
+            <a:extLst>
+              <a:ext uri="{FF2B5EF4-FFF2-40B4-BE49-F238E27FC236}">
+                <a16:creationId xmlns:a16="http://schemas.microsoft.com/office/drawing/2014/main" id="{F52CAD65-0FE5-40F3-A379-67E19FB25BE0}"/>
+              </a:ext>
+            </a:extLst>
+          </p:cNvPr>
+          <p:cNvSpPr>
+            <a:spLocks noGrp="1"/>
+          </p:cNvSpPr>
+          <p:nvPr>
+            <p:ph type="title"/>
+          </p:nvPr>
+        </p:nvSpPr>
+        <p:spPr>
+          <a:xfrm>
+            <a:off x="1141412" y="0"/>
+            <a:ext cx="9905998" cy="564330"/>
+          </a:xfrm>
+        </p:spPr>
+        <p:txBody>
+          <a:bodyPr>
+            <a:noAutofit/>
+          </a:bodyPr>
+          <a:lstStyle/>
+          <a:p>
+            <a:r>
+              <a:rPr lang="en-US" dirty="0"/>
+              <a:t>Writing JSON Files</a:t>
+            </a:r>
+          </a:p>
+        </p:txBody>
+      </p:sp>
+      <p:sp>
+        <p:nvSpPr>
+          <p:cNvPr id="3" name="Content Placeholder 2">
+            <a:extLst>
+              <a:ext uri="{FF2B5EF4-FFF2-40B4-BE49-F238E27FC236}">
+                <a16:creationId xmlns:a16="http://schemas.microsoft.com/office/drawing/2014/main" id="{5AA4D1FB-7B43-4286-BD99-63583D56D4CC}"/>
+              </a:ext>
+            </a:extLst>
+          </p:cNvPr>
+          <p:cNvSpPr>
+            <a:spLocks noGrp="1"/>
+          </p:cNvSpPr>
+          <p:nvPr>
+            <p:ph idx="1"/>
+          </p:nvPr>
+        </p:nvSpPr>
+        <p:spPr>
+          <a:xfrm>
+            <a:off x="0" y="564330"/>
+            <a:ext cx="12284765" cy="6293670"/>
+          </a:xfrm>
+        </p:spPr>
+        <p:txBody>
+          <a:bodyPr>
+            <a:noAutofit/>
+          </a:bodyPr>
+          <a:lstStyle/>
+          <a:p>
+            <a:r>
+              <a:rPr lang="en-US" sz="3100" dirty="0"/>
+              <a:t>First, Check you data is in the correct format for JSON to read.</a:t>
+            </a:r>
+          </a:p>
+          <a:p>
+            <a:pPr marL="0" indent="0">
+              <a:buNone/>
+            </a:pPr>
+            <a:endParaRPr lang="en-US" sz="3100" dirty="0"/>
+          </a:p>
+          <a:p>
+            <a:r>
+              <a:rPr lang="en-US" sz="3100" dirty="0"/>
+              <a:t>Second, </a:t>
+            </a:r>
+            <a:r>
+              <a:rPr lang="en-US" sz="3100" dirty="0" err="1"/>
+              <a:t>Stringify</a:t>
+            </a:r>
+            <a:r>
+              <a:rPr lang="en-US" sz="3100" dirty="0"/>
+              <a:t> the data using this function “</a:t>
+            </a:r>
+            <a:r>
+              <a:rPr lang="en-US" sz="3100" dirty="0" err="1"/>
+              <a:t>JSON.stringify</a:t>
+            </a:r>
+            <a:r>
+              <a:rPr lang="en-US" sz="3100" dirty="0"/>
+              <a:t>(data)”. It can be save to a variable.</a:t>
+            </a:r>
+          </a:p>
+          <a:p>
+            <a:pPr marL="0" indent="0">
+              <a:buNone/>
+            </a:pPr>
+            <a:endParaRPr lang="en-US" sz="3100" dirty="0"/>
+          </a:p>
+          <a:p>
+            <a:r>
+              <a:rPr lang="en-US" sz="3100" dirty="0"/>
+              <a:t>Third, You can use “</a:t>
+            </a:r>
+            <a:r>
+              <a:rPr lang="en-US" sz="3100" dirty="0" err="1"/>
+              <a:t>fs.writeFile</a:t>
+            </a:r>
+            <a:r>
+              <a:rPr lang="en-US" sz="3100" dirty="0"/>
+              <a:t>'(‘</a:t>
+            </a:r>
+            <a:r>
+              <a:rPr lang="en-US" sz="3100" dirty="0" err="1"/>
+              <a:t>Data.json</a:t>
+            </a:r>
+            <a:r>
+              <a:rPr lang="en-US" sz="3100" dirty="0"/>
+              <a:t>’, data)” or “</a:t>
+            </a:r>
+            <a:r>
+              <a:rPr lang="en-US" sz="3100" dirty="0" err="1"/>
+              <a:t>fs.writeFileSync</a:t>
+            </a:r>
+            <a:r>
+              <a:rPr lang="en-US" sz="3100" dirty="0"/>
+              <a:t>(‘</a:t>
+            </a:r>
+            <a:r>
+              <a:rPr lang="en-US" sz="3100" dirty="0" err="1"/>
+              <a:t>Data.json’,data</a:t>
+            </a:r>
+            <a:r>
+              <a:rPr lang="en-US" sz="3100" dirty="0"/>
+              <a:t>)”. difference between the two code is the first one is asynchronous which mean it will jump to next code even if it is not finish reading. And the second code is synchronous which mean the code must be finish before jumping to the next one. </a:t>
+            </a:r>
+          </a:p>
+          <a:p>
+            <a:pPr marL="0" indent="0">
+              <a:buNone/>
+            </a:pPr>
+            <a:endParaRPr lang="en-US" sz="3200" dirty="0"/>
+          </a:p>
+        </p:txBody>
+      </p:sp>
+    </p:spTree>
+    <p:extLst>
+      <p:ext uri="{BB962C8B-B14F-4D97-AF65-F5344CB8AC3E}">
+        <p14:creationId xmlns:p14="http://schemas.microsoft.com/office/powerpoint/2010/main" val="3103083553"/>
       </p:ext>
     </p:extLst>
   </p:cSld>
@@ -13728,13 +13827,13 @@
         </p:spPr>
         <p:txBody>
           <a:bodyPr>
-            <a:normAutofit fontScale="90000"/>
+            <a:noAutofit/>
           </a:bodyPr>
           <a:lstStyle/>
           <a:p>
             <a:r>
               <a:rPr lang="en-US" dirty="0"/>
-              <a:t>Writing JSON Files</a:t>
+              <a:t>Writing JSON Files Part 2.</a:t>
             </a:r>
           </a:p>
         </p:txBody>
@@ -13757,45 +13856,108 @@
         </p:nvSpPr>
         <p:spPr>
           <a:xfrm>
-            <a:off x="1141412" y="564330"/>
-            <a:ext cx="9905999" cy="3541714"/>
+            <a:off x="0" y="564330"/>
+            <a:ext cx="12284765" cy="6293670"/>
           </a:xfrm>
         </p:spPr>
         <p:txBody>
           <a:bodyPr>
-            <a:normAutofit/>
+            <a:normAutofit fontScale="92500"/>
           </a:bodyPr>
           <a:lstStyle/>
           <a:p>
             <a:r>
-              <a:rPr lang="en-US" dirty="0"/>
-              <a:t>First, Check you data is in the correct format for JSON to read.</a:t>
-            </a:r>
-          </a:p>
-          <a:p>
-            <a:r>
-              <a:rPr lang="en-US" dirty="0"/>
-              <a:t>Second, </a:t>
-            </a:r>
-            <a:r>
-              <a:rPr lang="en-US" dirty="0" err="1"/>
-              <a:t>Stringify</a:t>
-            </a:r>
-            <a:r>
-              <a:rPr lang="en-US"/>
-              <a:t> </a:t>
-            </a:r>
-            <a:endParaRPr lang="en-US" dirty="0"/>
-          </a:p>
-          <a:p>
-            <a:endParaRPr lang="en-US" dirty="0"/>
+              <a:rPr lang="en-US" sz="3200" dirty="0"/>
+              <a:t>Third-part-two, Writing the function have the minimum of two agreement and have the maximum of four agreement. It only required to have The Json file and The data sending to the json file. The extra two is the character encode and callback function. “</a:t>
+            </a:r>
+            <a:r>
+              <a:rPr lang="en-US" sz="3200" dirty="0" err="1"/>
+              <a:t>fs.writeFile</a:t>
+            </a:r>
+            <a:r>
+              <a:rPr lang="en-US" sz="3200" dirty="0"/>
+              <a:t>(‘</a:t>
+            </a:r>
+            <a:r>
+              <a:rPr lang="en-US" sz="3200" dirty="0" err="1"/>
+              <a:t>Filename.json</a:t>
+            </a:r>
+            <a:r>
+              <a:rPr lang="en-US" sz="3200" dirty="0"/>
+              <a:t>’, data, ‘utf8’, function(){})” </a:t>
+            </a:r>
+          </a:p>
+          <a:p>
+            <a:endParaRPr lang="en-US" sz="3200" dirty="0"/>
+          </a:p>
+          <a:p>
+            <a:r>
+              <a:rPr lang="en-US" sz="3200" dirty="0"/>
+              <a:t>Finally, An optional test is to read the file and log the data to make sure everything is in order.</a:t>
+            </a:r>
+          </a:p>
+          <a:p>
+            <a:endParaRPr lang="en-US" sz="3200" dirty="0"/>
+          </a:p>
+          <a:p>
+            <a:r>
+              <a:rPr lang="en-US" sz="3200" dirty="0"/>
+              <a:t>PS, It also can merge the JSON </a:t>
+            </a:r>
+            <a:r>
+              <a:rPr lang="en-US" sz="3200" dirty="0" err="1"/>
+              <a:t>stringify</a:t>
+            </a:r>
+            <a:r>
+              <a:rPr lang="en-US" sz="3200" dirty="0"/>
+              <a:t> function into the </a:t>
+            </a:r>
+            <a:r>
+              <a:rPr lang="en-US" sz="3200" dirty="0" err="1"/>
+              <a:t>fs.writeFile</a:t>
+            </a:r>
+            <a:r>
+              <a:rPr lang="en-US" sz="3200" dirty="0"/>
+              <a:t> function for example “</a:t>
+            </a:r>
+            <a:r>
+              <a:rPr lang="en-US" sz="3200" dirty="0" err="1"/>
+              <a:t>fs.writeFile</a:t>
+            </a:r>
+            <a:r>
+              <a:rPr lang="en-US" sz="3200" dirty="0"/>
+              <a:t>(‘data.json’,</a:t>
+            </a:r>
+            <a:r>
+              <a:rPr lang="en-US" sz="3200" dirty="0" err="1"/>
+              <a:t>JSON.stringify</a:t>
+            </a:r>
+            <a:r>
+              <a:rPr lang="en-US" sz="3200" dirty="0"/>
+              <a:t>(data))</a:t>
+            </a:r>
+          </a:p>
+          <a:p>
+            <a:endParaRPr lang="en-US" sz="3200" dirty="0"/>
+          </a:p>
+          <a:p>
+            <a:endParaRPr lang="en-US" sz="3200" dirty="0"/>
+          </a:p>
+          <a:p>
+            <a:endParaRPr lang="en-US" sz="3200" dirty="0"/>
+          </a:p>
+          <a:p>
+            <a:pPr marL="0" indent="0">
+              <a:buNone/>
+            </a:pPr>
+            <a:endParaRPr lang="en-US" sz="3200" dirty="0"/>
           </a:p>
         </p:txBody>
       </p:sp>
     </p:spTree>
     <p:extLst>
       <p:ext uri="{BB962C8B-B14F-4D97-AF65-F5344CB8AC3E}">
-        <p14:creationId xmlns:p14="http://schemas.microsoft.com/office/powerpoint/2010/main" val="3103083553"/>
+        <p14:creationId xmlns:p14="http://schemas.microsoft.com/office/powerpoint/2010/main" val="3989090937"/>
       </p:ext>
     </p:extLst>
   </p:cSld>
@@ -14060,6 +14222,21 @@
 </file>
 
 <file path=customXml/item1.xml><?xml version="1.0" encoding="utf-8"?>
+<p:properties xmlns:p="http://schemas.microsoft.com/office/2006/metadata/properties" xmlns:xsi="http://www.w3.org/2001/XMLSchema-instance" xmlns:pc="http://schemas.microsoft.com/office/infopath/2007/PartnerControls">
+  <documentManagement/>
+</p:properties>
+</file>
+
+<file path=customXml/item2.xml><?xml version="1.0" encoding="utf-8"?>
+<?mso-contentType ?>
+<FormTemplates xmlns="http://schemas.microsoft.com/sharepoint/v3/contenttype/forms">
+  <Display>DocumentLibraryForm</Display>
+  <Edit>DocumentLibraryForm</Edit>
+  <New>DocumentLibraryForm</New>
+</FormTemplates>
+</file>
+
+<file path=customXml/item3.xml><?xml version="1.0" encoding="utf-8"?>
 <ct:contentTypeSchema xmlns:ct="http://schemas.microsoft.com/office/2006/metadata/contentType" xmlns:ma="http://schemas.microsoft.com/office/2006/metadata/properties/metaAttributes" ct:_="" ma:_="" ma:contentTypeName="Document" ma:contentTypeID="0x0101001B82B3A859C5B4419E9F4DEF0565ED83" ma:contentTypeVersion="9" ma:contentTypeDescription="Create a new document." ma:contentTypeScope="" ma:versionID="1eaa2e320d1106e777b278df4a94d116">
   <xsd:schema xmlns:xsd="http://www.w3.org/2001/XMLSchema" xmlns:xs="http://www.w3.org/2001/XMLSchema" xmlns:p="http://schemas.microsoft.com/office/2006/metadata/properties" xmlns:ns3="afa79ede-8800-4b38-b2d4-921a0a289804" targetNamespace="http://schemas.microsoft.com/office/2006/metadata/properties" ma:root="true" ma:fieldsID="8ad9c0514fa9b086ffa5420a6f56513e" ns3:_="">
     <xsd:import namespace="afa79ede-8800-4b38-b2d4-921a0a289804"/>
@@ -14237,22 +14414,31 @@
 </ct:contentTypeSchema>
 </file>
 
-<file path=customXml/item2.xml><?xml version="1.0" encoding="utf-8"?>
-<?mso-contentType ?>
-<FormTemplates xmlns="http://schemas.microsoft.com/sharepoint/v3/contenttype/forms">
-  <Display>DocumentLibraryForm</Display>
-  <Edit>DocumentLibraryForm</Edit>
-  <New>DocumentLibraryForm</New>
-</FormTemplates>
+<file path=customXml/itemProps1.xml><?xml version="1.0" encoding="utf-8"?>
+<ds:datastoreItem xmlns:ds="http://schemas.openxmlformats.org/officeDocument/2006/customXml" ds:itemID="{4D7DF473-E457-455C-964A-71866F94C31D}">
+  <ds:schemaRefs>
+    <ds:schemaRef ds:uri="http://schemas.openxmlformats.org/package/2006/metadata/core-properties"/>
+    <ds:schemaRef ds:uri="http://schemas.microsoft.com/office/infopath/2007/PartnerControls"/>
+    <ds:schemaRef ds:uri="http://purl.org/dc/dcmitype/"/>
+    <ds:schemaRef ds:uri="http://schemas.microsoft.com/office/2006/metadata/properties"/>
+    <ds:schemaRef ds:uri="http://schemas.microsoft.com/office/2006/documentManagement/types"/>
+    <ds:schemaRef ds:uri="http://purl.org/dc/terms/"/>
+    <ds:schemaRef ds:uri="afa79ede-8800-4b38-b2d4-921a0a289804"/>
+    <ds:schemaRef ds:uri="http://www.w3.org/XML/1998/namespace"/>
+    <ds:schemaRef ds:uri="http://purl.org/dc/elements/1.1/"/>
+  </ds:schemaRefs>
+</ds:datastoreItem>
 </file>
 
-<file path=customXml/item3.xml><?xml version="1.0" encoding="utf-8"?>
-<p:properties xmlns:p="http://schemas.microsoft.com/office/2006/metadata/properties" xmlns:xsi="http://www.w3.org/2001/XMLSchema-instance" xmlns:pc="http://schemas.microsoft.com/office/infopath/2007/PartnerControls">
-  <documentManagement/>
-</p:properties>
+<file path=customXml/itemProps2.xml><?xml version="1.0" encoding="utf-8"?>
+<ds:datastoreItem xmlns:ds="http://schemas.openxmlformats.org/officeDocument/2006/customXml" ds:itemID="{FBF644BF-741F-4203-BDCE-6E53299E5B2C}">
+  <ds:schemaRefs>
+    <ds:schemaRef ds:uri="http://schemas.microsoft.com/sharepoint/v3/contenttype/forms"/>
+  </ds:schemaRefs>
+</ds:datastoreItem>
 </file>
 
-<file path=customXml/itemProps1.xml><?xml version="1.0" encoding="utf-8"?>
+<file path=customXml/itemProps3.xml><?xml version="1.0" encoding="utf-8"?>
 <ds:datastoreItem xmlns:ds="http://schemas.openxmlformats.org/officeDocument/2006/customXml" ds:itemID="{5A29D992-F928-4C1A-9576-9148529E41F0}">
   <ds:schemaRefs>
     <ds:schemaRef ds:uri="http://schemas.microsoft.com/office/2006/metadata/contentType"/>
@@ -14268,28 +14454,4 @@
     <ds:schemaRef ds:uri="http://schemas.microsoft.com/internal/obd"/>
   </ds:schemaRefs>
 </ds:datastoreItem>
-</file>
-
-<file path=customXml/itemProps2.xml><?xml version="1.0" encoding="utf-8"?>
-<ds:datastoreItem xmlns:ds="http://schemas.openxmlformats.org/officeDocument/2006/customXml" ds:itemID="{FBF644BF-741F-4203-BDCE-6E53299E5B2C}">
-  <ds:schemaRefs>
-    <ds:schemaRef ds:uri="http://schemas.microsoft.com/sharepoint/v3/contenttype/forms"/>
-  </ds:schemaRefs>
-</ds:datastoreItem>
-</file>
-
-<file path=customXml/itemProps3.xml><?xml version="1.0" encoding="utf-8"?>
-<ds:datastoreItem xmlns:ds="http://schemas.openxmlformats.org/officeDocument/2006/customXml" ds:itemID="{4D7DF473-E457-455C-964A-71866F94C31D}">
-  <ds:schemaRefs>
-    <ds:schemaRef ds:uri="http://schemas.openxmlformats.org/package/2006/metadata/core-properties"/>
-    <ds:schemaRef ds:uri="http://schemas.microsoft.com/office/infopath/2007/PartnerControls"/>
-    <ds:schemaRef ds:uri="http://purl.org/dc/dcmitype/"/>
-    <ds:schemaRef ds:uri="http://schemas.microsoft.com/office/2006/metadata/properties"/>
-    <ds:schemaRef ds:uri="http://schemas.microsoft.com/office/2006/documentManagement/types"/>
-    <ds:schemaRef ds:uri="http://purl.org/dc/terms/"/>
-    <ds:schemaRef ds:uri="afa79ede-8800-4b38-b2d4-921a0a289804"/>
-    <ds:schemaRef ds:uri="http://www.w3.org/XML/1998/namespace"/>
-    <ds:schemaRef ds:uri="http://purl.org/dc/elements/1.1/"/>
-  </ds:schemaRefs>
-</ds:datastoreItem>
 </file>
</xml_diff>